<commit_message>
actualización de la intranet con creser
</commit_message>
<xml_diff>
--- a/documentos/pres.pptx
+++ b/documentos/pres.pptx
@@ -138,10 +138,6 @@
 </p:presentation>
 </file>
 
-<file path=ppt/revisionInfo.xml><?xml version="1.0" encoding="utf-8"?>
-<p1510:revInfo xmlns:a="http://schemas.openxmlformats.org/drawingml/2006/main" xmlns:r="http://schemas.openxmlformats.org/officeDocument/2006/relationships" xmlns:p1510="http://schemas.microsoft.com/office/powerpoint/2015/10/main"/>
-</file>
-
 <file path=ppt/slideLayouts/slideLayout1.xml><?xml version="1.0" encoding="utf-8"?>
 <p:sldLayout xmlns:a="http://schemas.openxmlformats.org/drawingml/2006/main" xmlns:r="http://schemas.openxmlformats.org/officeDocument/2006/relationships" xmlns:p="http://schemas.openxmlformats.org/presentationml/2006/main" type="title" preserve="1">
   <p:cSld name="Diapositiva de título">
@@ -273,7 +269,7 @@
           <a:p>
             <a:fld id="{C8B3C806-6BA0-491B-AE34-C1B9601E51CF}" type="datetimeFigureOut">
               <a:rPr lang="es-CO" smtClean="0"/>
-              <a:t>25/01/2018</a:t>
+              <a:t>29/07/2019</a:t>
             </a:fld>
             <a:endParaRPr lang="es-CO"/>
           </a:p>
@@ -443,7 +439,7 @@
           <a:p>
             <a:fld id="{C8B3C806-6BA0-491B-AE34-C1B9601E51CF}" type="datetimeFigureOut">
               <a:rPr lang="es-CO" smtClean="0"/>
-              <a:t>25/01/2018</a:t>
+              <a:t>29/07/2019</a:t>
             </a:fld>
             <a:endParaRPr lang="es-CO"/>
           </a:p>
@@ -623,7 +619,7 @@
           <a:p>
             <a:fld id="{C8B3C806-6BA0-491B-AE34-C1B9601E51CF}" type="datetimeFigureOut">
               <a:rPr lang="es-CO" smtClean="0"/>
-              <a:t>25/01/2018</a:t>
+              <a:t>29/07/2019</a:t>
             </a:fld>
             <a:endParaRPr lang="es-CO"/>
           </a:p>
@@ -793,7 +789,7 @@
           <a:p>
             <a:fld id="{C8B3C806-6BA0-491B-AE34-C1B9601E51CF}" type="datetimeFigureOut">
               <a:rPr lang="es-CO" smtClean="0"/>
-              <a:t>25/01/2018</a:t>
+              <a:t>29/07/2019</a:t>
             </a:fld>
             <a:endParaRPr lang="es-CO"/>
           </a:p>
@@ -1039,7 +1035,7 @@
           <a:p>
             <a:fld id="{C8B3C806-6BA0-491B-AE34-C1B9601E51CF}" type="datetimeFigureOut">
               <a:rPr lang="es-CO" smtClean="0"/>
-              <a:t>25/01/2018</a:t>
+              <a:t>29/07/2019</a:t>
             </a:fld>
             <a:endParaRPr lang="es-CO"/>
           </a:p>
@@ -1271,7 +1267,7 @@
           <a:p>
             <a:fld id="{C8B3C806-6BA0-491B-AE34-C1B9601E51CF}" type="datetimeFigureOut">
               <a:rPr lang="es-CO" smtClean="0"/>
-              <a:t>25/01/2018</a:t>
+              <a:t>29/07/2019</a:t>
             </a:fld>
             <a:endParaRPr lang="es-CO"/>
           </a:p>
@@ -1638,7 +1634,7 @@
           <a:p>
             <a:fld id="{C8B3C806-6BA0-491B-AE34-C1B9601E51CF}" type="datetimeFigureOut">
               <a:rPr lang="es-CO" smtClean="0"/>
-              <a:t>25/01/2018</a:t>
+              <a:t>29/07/2019</a:t>
             </a:fld>
             <a:endParaRPr lang="es-CO"/>
           </a:p>
@@ -1756,7 +1752,7 @@
           <a:p>
             <a:fld id="{C8B3C806-6BA0-491B-AE34-C1B9601E51CF}" type="datetimeFigureOut">
               <a:rPr lang="es-CO" smtClean="0"/>
-              <a:t>25/01/2018</a:t>
+              <a:t>29/07/2019</a:t>
             </a:fld>
             <a:endParaRPr lang="es-CO"/>
           </a:p>
@@ -1851,7 +1847,7 @@
           <a:p>
             <a:fld id="{C8B3C806-6BA0-491B-AE34-C1B9601E51CF}" type="datetimeFigureOut">
               <a:rPr lang="es-CO" smtClean="0"/>
-              <a:t>25/01/2018</a:t>
+              <a:t>29/07/2019</a:t>
             </a:fld>
             <a:endParaRPr lang="es-CO"/>
           </a:p>
@@ -2128,7 +2124,7 @@
           <a:p>
             <a:fld id="{C8B3C806-6BA0-491B-AE34-C1B9601E51CF}" type="datetimeFigureOut">
               <a:rPr lang="es-CO" smtClean="0"/>
-              <a:t>25/01/2018</a:t>
+              <a:t>29/07/2019</a:t>
             </a:fld>
             <a:endParaRPr lang="es-CO"/>
           </a:p>
@@ -2381,7 +2377,7 @@
           <a:p>
             <a:fld id="{C8B3C806-6BA0-491B-AE34-C1B9601E51CF}" type="datetimeFigureOut">
               <a:rPr lang="es-CO" smtClean="0"/>
-              <a:t>25/01/2018</a:t>
+              <a:t>29/07/2019</a:t>
             </a:fld>
             <a:endParaRPr lang="es-CO"/>
           </a:p>
@@ -2594,7 +2590,7 @@
           <a:p>
             <a:fld id="{C8B3C806-6BA0-491B-AE34-C1B9601E51CF}" type="datetimeFigureOut">
               <a:rPr lang="es-CO" smtClean="0"/>
-              <a:t>25/01/2018</a:t>
+              <a:t>29/07/2019</a:t>
             </a:fld>
             <a:endParaRPr lang="es-CO"/>
           </a:p>
@@ -3574,7 +3570,7 @@
               <a:rPr lang="es-CO" sz="1600" b="1" dirty="0">
                 <a:cs typeface="Arial" pitchFamily="34" charset="0"/>
               </a:rPr>
-              <a:t>Fundamental para asegurar la asertividad en la gestión de cualquier empresa es la claridad en la definiciones de los principios y valores reconocidos por la organización para el permanente desarrollo de su actividad y obtener</a:t>
+              <a:t>Fundamental para asegurar la asertividad en la gestión de cualquier empresa es la claridad en la definición de los principios y valores reconocidos por la organización para el permanente desarrollo de su actividad y obtener</a:t>
             </a:r>
           </a:p>
           <a:p>
@@ -3613,30 +3609,6 @@
           </a:p>
         </p:txBody>
       </p:sp>
-      <p:pic>
-        <p:nvPicPr>
-          <p:cNvPr id="5" name="Imagen 4"/>
-          <p:cNvPicPr>
-            <a:picLocks noChangeAspect="1"/>
-          </p:cNvPicPr>
-          <p:nvPr/>
-        </p:nvPicPr>
-        <p:blipFill>
-          <a:blip r:embed="rId3"/>
-          <a:stretch>
-            <a:fillRect/>
-          </a:stretch>
-        </p:blipFill>
-        <p:spPr>
-          <a:xfrm>
-            <a:off x="1524001" y="2788837"/>
-            <a:ext cx="9144000" cy="1752552"/>
-          </a:xfrm>
-          <a:prstGeom prst="rect">
-            <a:avLst/>
-          </a:prstGeom>
-        </p:spPr>
-      </p:pic>
       <p:sp>
         <p:nvSpPr>
           <p:cNvPr id="10" name="Rectángulo 9"/>
@@ -3666,6 +3638,115 @@
               <a:t>Con base a lo anterior, los valores y principios que el grupo directivo de CONSUMER ELECTRONICS GROUP desea resaltar y propender por establecer y/o mantener dentro del modelo de cultura organizacional al interior de la Empresa, en los próximos años, son:</a:t>
             </a:r>
             <a:endParaRPr lang="es-CO" sz="1600" dirty="0">
+              <a:latin typeface="+mj-lt"/>
+            </a:endParaRPr>
+          </a:p>
+        </p:txBody>
+      </p:sp>
+      <p:sp>
+        <p:nvSpPr>
+          <p:cNvPr id="4" name="CuadroTexto 3">
+            <a:extLst>
+              <a:ext uri="{FF2B5EF4-FFF2-40B4-BE49-F238E27FC236}">
+                <a16:creationId xmlns:a16="http://schemas.microsoft.com/office/drawing/2014/main" id="{86AEF014-05AC-4BD2-8ECB-A5B115EFBCF1}"/>
+              </a:ext>
+            </a:extLst>
+          </p:cNvPr>
+          <p:cNvSpPr txBox="1"/>
+          <p:nvPr/>
+        </p:nvSpPr>
+        <p:spPr>
+          <a:xfrm>
+            <a:off x="1554050" y="2775096"/>
+            <a:ext cx="9144000" cy="1708160"/>
+          </a:xfrm>
+          <a:prstGeom prst="rect">
+            <a:avLst/>
+          </a:prstGeom>
+          <a:noFill/>
+        </p:spPr>
+        <p:txBody>
+          <a:bodyPr wrap="square" rtlCol="0">
+            <a:spAutoFit/>
+          </a:bodyPr>
+          <a:lstStyle/>
+          <a:p>
+            <a:pPr marL="342900" indent="-342900">
+              <a:buAutoNum type="arabicPeriod"/>
+            </a:pPr>
+            <a:r>
+              <a:rPr lang="es-CO" sz="1500" dirty="0">
+                <a:latin typeface="+mj-lt"/>
+              </a:rPr>
+              <a:t>¿Quiénes somos?</a:t>
+            </a:r>
+          </a:p>
+          <a:p>
+            <a:pPr marL="342900" indent="-342900">
+              <a:buAutoNum type="arabicPeriod"/>
+            </a:pPr>
+            <a:r>
+              <a:rPr lang="es-CO" sz="1500" dirty="0">
+                <a:latin typeface="+mj-lt"/>
+              </a:rPr>
+              <a:t>¿Qué tipo de personas somos?</a:t>
+            </a:r>
+          </a:p>
+          <a:p>
+            <a:pPr marL="342900" indent="-342900">
+              <a:buAutoNum type="arabicPeriod"/>
+            </a:pPr>
+            <a:r>
+              <a:rPr lang="es-CO" sz="1500" dirty="0">
+                <a:latin typeface="+mj-lt"/>
+              </a:rPr>
+              <a:t>¿Qué tipo de colaboradores debemos tener en la empresa?</a:t>
+            </a:r>
+          </a:p>
+          <a:p>
+            <a:pPr marL="342900" indent="-342900">
+              <a:buAutoNum type="arabicPeriod"/>
+            </a:pPr>
+            <a:r>
+              <a:rPr lang="es-CO" sz="1500" dirty="0">
+                <a:latin typeface="+mj-lt"/>
+              </a:rPr>
+              <a:t>¿Qué características como personas debemos tener para poder trabajar en CONSUMER ELECTRONISCS GROUP?</a:t>
+            </a:r>
+          </a:p>
+          <a:p>
+            <a:pPr marL="342900" indent="-342900">
+              <a:buAutoNum type="arabicPeriod"/>
+            </a:pPr>
+            <a:r>
+              <a:rPr lang="es-CO" sz="1500" dirty="0">
+                <a:latin typeface="+mj-lt"/>
+              </a:rPr>
+              <a:t>¿Qué nos identifica?</a:t>
+            </a:r>
+          </a:p>
+          <a:p>
+            <a:pPr marL="342900" indent="-342900">
+              <a:buAutoNum type="arabicPeriod"/>
+            </a:pPr>
+            <a:r>
+              <a:rPr lang="es-CO" sz="1500" dirty="0">
+                <a:latin typeface="+mj-lt"/>
+              </a:rPr>
+              <a:t>¿En que creemos?</a:t>
+            </a:r>
+          </a:p>
+          <a:p>
+            <a:pPr marL="342900" indent="-342900">
+              <a:buAutoNum type="arabicPeriod"/>
+            </a:pPr>
+            <a:r>
+              <a:rPr lang="es-CO" sz="1500" dirty="0">
+                <a:latin typeface="+mj-lt"/>
+              </a:rPr>
+              <a:t>¿Con que tipo de personas podemos construir resultados?</a:t>
+            </a:r>
+            <a:endParaRPr lang="es-ES" sz="1500" dirty="0">
               <a:latin typeface="+mj-lt"/>
             </a:endParaRPr>
           </a:p>
@@ -4576,8 +4657,8 @@
         </p:nvSpPr>
         <p:spPr bwMode="auto">
           <a:xfrm>
-            <a:off x="827584" y="1597442"/>
-            <a:ext cx="7992888" cy="3970318"/>
+            <a:off x="827584" y="1381999"/>
+            <a:ext cx="7992888" cy="4401205"/>
           </a:xfrm>
           <a:prstGeom prst="rect">
             <a:avLst/>
@@ -4622,7 +4703,7 @@
             <a:pPr algn="just" defTabSz="2200275"/>
             <a:r>
               <a:rPr lang="es-CO" sz="1400" dirty="0"/>
-              <a:t>“La declaratoria de los valores y principios definidos  van a ser trasmitidos a toda la Empresa y a la comunidad en general, a través del siguiente credo”:</a:t>
+              <a:t>La declaratoria de los valores y principios definidos  van a ser trasmitidos a toda la Empresa y a la comunidad en general, a través del siguiente credo:</a:t>
             </a:r>
           </a:p>
           <a:p>
@@ -4637,7 +4718,7 @@
                   <a:srgbClr val="000066"/>
                 </a:solidFill>
               </a:rPr>
-              <a:t>Somos un equipo comprometido que cuenta con una excelente vocación de servicio y resultados, y actúa con transparencia y oportunidad; logra altos estándares de cumplimiento, y promulga el respeto entre todos y el entorno que lo rodea. </a:t>
+              <a:t>Somos un equipo comprometido que cuenta con una excelente vocación de servicio y resultados. Actuamos con transparencia y oportunidad. Logramos altos estándares de cumplimiento y promulgamos el respeto entre todos y el entorno que nos rodea. </a:t>
             </a:r>
           </a:p>
           <a:p>
@@ -4857,7 +4938,7 @@
               <a:rPr lang="es-ES_tradnl" sz="1400" dirty="0">
                 <a:cs typeface="Arial" pitchFamily="34" charset="0"/>
               </a:rPr>
-              <a:t>Es una declaración acerca de la razón de ser de una empresa y del estilo que la caracteriza. Debe reflejar el querer ser de la Organización, el mercado que desea servir y la identificación clara de las principales actividades de la Empresa.</a:t>
+              <a:t>Es una declaración acerca de la razón de ser de una empresa y del estilo que la caracteriza. Debe reflejar el querer ser de la organización, el mercado que desea servir y la identificación clara de las principales actividades de la Empresa.</a:t>
             </a:r>
             <a:br>
               <a:rPr lang="es-ES_tradnl" sz="1400" dirty="0">
@@ -4899,7 +4980,7 @@
               <a:rPr lang="es-ES_tradnl" sz="1400" dirty="0">
                 <a:cs typeface="Arial" pitchFamily="34" charset="0"/>
               </a:rPr>
-              <a:t>1. Que hacemos en nuestra Empresa, por que nos caracterizamos, en que podemos decir que somos buenos?</a:t>
+              <a:t>1. ¿Qué hacemos en nuestra Empresa? ¿Por qué nos caracterizamos y en que podemos decir que somos buenos?</a:t>
             </a:r>
             <a:br>
               <a:rPr lang="es-ES_tradnl" sz="1400" dirty="0">
@@ -4910,7 +4991,7 @@
               <a:rPr lang="es-ES_tradnl" sz="1400" dirty="0">
                 <a:cs typeface="Arial" pitchFamily="34" charset="0"/>
               </a:rPr>
-              <a:t>2.Cual es la esencia de nuestro negocio, a que nos dedicamos?</a:t>
+              <a:t>2. ¿Cuál es la esencia de nuestro negocio y a que nos dedicamos?</a:t>
             </a:r>
             <a:br>
               <a:rPr lang="es-ES_tradnl" sz="1400" dirty="0">
@@ -4921,7 +5002,7 @@
               <a:rPr lang="es-ES_tradnl" sz="1400" dirty="0">
                 <a:cs typeface="Arial" pitchFamily="34" charset="0"/>
               </a:rPr>
-              <a:t>3.Cual es nuestra razón de ser? Cual es nuestro objetivo Organizacional primario?</a:t>
+              <a:t>3. ¿Cuál es nuestra razón de ser? ¿Cuál es nuestro objetivo Organizacional primario?</a:t>
             </a:r>
             <a:br>
               <a:rPr lang="es-ES_tradnl" sz="1400" dirty="0">
@@ -4932,7 +5013,7 @@
               <a:rPr lang="es-ES_tradnl" sz="1400" dirty="0">
                 <a:cs typeface="Arial" pitchFamily="34" charset="0"/>
               </a:rPr>
-              <a:t>4. Cual es nuestro cliente objetivo?</a:t>
+              <a:t>4. ¿Quién es nuestro cliente objetivo?</a:t>
             </a:r>
             <a:br>
               <a:rPr lang="es-ES_tradnl" sz="1400" dirty="0">
@@ -4943,7 +5024,7 @@
               <a:rPr lang="es-ES_tradnl" sz="1400" dirty="0">
                 <a:cs typeface="Arial" pitchFamily="34" charset="0"/>
               </a:rPr>
-              <a:t>5. Cual es nuestro ámbito geográfico de acción?</a:t>
+              <a:t>5. ¿Cuál es nuestro ámbito geográfico de acción?</a:t>
             </a:r>
             <a:br>
               <a:rPr lang="es-ES_tradnl" sz="1400" dirty="0">
@@ -4954,7 +5035,7 @@
               <a:rPr lang="es-ES_tradnl" sz="1400" dirty="0">
                 <a:cs typeface="Arial" pitchFamily="34" charset="0"/>
               </a:rPr>
-              <a:t>6. Cual es nuestra ventaja competitiva actual?</a:t>
+              <a:t>6. ¿Cuál es nuestra ventaja competitiva actual?</a:t>
             </a:r>
             <a:br>
               <a:rPr lang="es-ES_tradnl" sz="1400" dirty="0">
@@ -4965,7 +5046,7 @@
               <a:rPr lang="es-ES_tradnl" sz="1400" dirty="0">
                 <a:cs typeface="Arial" pitchFamily="34" charset="0"/>
               </a:rPr>
-              <a:t>7. Que nos diferencia de la competencia?</a:t>
+              <a:t>7. ¿Qué nos diferencia de la competencia?</a:t>
             </a:r>
             <a:br>
               <a:rPr lang="es-ES_tradnl" sz="1400" dirty="0">
@@ -5593,7 +5674,7 @@
               <a:rPr lang="es-ES_tradnl" sz="1400" dirty="0">
                 <a:cs typeface="Arial" pitchFamily="34" charset="0"/>
               </a:rPr>
-              <a:t>Que debemos preguntarnos para definir nuestra visión?</a:t>
+              <a:t>¿Qué debemos preguntarnos para definir nuestra visión?</a:t>
             </a:r>
           </a:p>
           <a:p>
@@ -5606,7 +5687,7 @@
               <a:rPr lang="es-ES_tradnl" sz="1400" dirty="0">
                 <a:cs typeface="Arial" pitchFamily="34" charset="0"/>
               </a:rPr>
-              <a:t>1. Como Empresa, que quiero lograr, que quiero hacer?</a:t>
+              <a:t>1. Como Empresa: ¿Qué quiero lograr? ¿Qué quiero hacer?</a:t>
             </a:r>
             <a:br>
               <a:rPr lang="es-ES_tradnl" sz="1400" dirty="0">
@@ -5617,7 +5698,7 @@
               <a:rPr lang="es-ES_tradnl" sz="1400" dirty="0">
                 <a:cs typeface="Arial" pitchFamily="34" charset="0"/>
               </a:rPr>
-              <a:t>2. Como Empresa, donde quiero estar en un futuro a corto, mediano y largo plazo?</a:t>
+              <a:t>2. Como Empresa: ¿Dónde quiero estar en un futuro a corto, mediano y largo plazo?</a:t>
             </a:r>
             <a:br>
               <a:rPr lang="es-ES_tradnl" sz="1400" dirty="0">
@@ -5628,7 +5709,7 @@
               <a:rPr lang="es-ES_tradnl" sz="1400" dirty="0">
                 <a:cs typeface="Arial" pitchFamily="34" charset="0"/>
               </a:rPr>
-              <a:t>3. Estos objetivos a quienes beneficiaran, y que aspectos voy a impactar durante este proceso?</a:t>
+              <a:t>3. ¿Estos objetivos a quienes beneficiaran, y que aspectos voy a impactar durante este proceso?</a:t>
             </a:r>
             <a:br>
               <a:rPr lang="es-ES_tradnl" sz="1400" dirty="0">
@@ -5639,7 +5720,7 @@
               <a:rPr lang="es-ES_tradnl" sz="1400" dirty="0">
                 <a:cs typeface="Arial" pitchFamily="34" charset="0"/>
               </a:rPr>
-              <a:t>4. Quiero como Empresa, ampliar mi zona de actuación?, mejorar mi servicio?, como quiero impactar a mis clientes actuales y potenciales?</a:t>
+              <a:t>4. ¿Quiero como Empresa, ampliar mi zona de actuación?, mejorar mi servicio?, ¿Cómo quiero impactar a mis clientes actuales y potenciales?</a:t>
             </a:r>
           </a:p>
           <a:p>
@@ -7043,7 +7124,7 @@
             </a:pPr>
             <a:r>
               <a:rPr lang="es-CO" sz="1600" b="1" dirty="0"/>
-              <a:t>Implementar un sistema de gestión integrado, que consolide un modelo de cultura por procesos, contribuya a la preservación del medio ambiente mediante la reducción de los impactos ambientales que se generen, fortalezca las condiciones ambientales para mejorar la salud y seguridad de los colaboradores, y establezca acciones para la prevención de actividades ilícitas en la cadena de suministro.</a:t>
+              <a:t>Implementar un sistema de gestión integrado, que consolide un modelo de cultura por procesos, contribuya a la preservación del medio ambiente mediante la reducción de los impactos ambientales que se generen, fortalezca las condiciones ambientales para mejorar la salud, seguridad de los colaboradores y establecimiento de acciones para la prevención de actividades ilícitas en la cadena de suministro.</a:t>
             </a:r>
           </a:p>
           <a:p>
@@ -7308,7 +7389,7 @@
                   <a:srgbClr val="4D4D4D"/>
                 </a:solidFill>
               </a:rPr>
-              <a:t>La Calidad y la búsqueda del mejoramiento continuo en nuestros procesos, y el respeto por el medio ambiente.</a:t>
+              <a:t>La calidad y la búsqueda del mejoramiento continuo en nuestros procesos, y el respeto por el medio ambiente.</a:t>
             </a:r>
           </a:p>
           <a:p>
@@ -7505,8 +7586,8 @@
         </p:nvSpPr>
         <p:spPr bwMode="auto">
           <a:xfrm>
-            <a:off x="1301934" y="1448074"/>
-            <a:ext cx="9144000" cy="800219"/>
+            <a:off x="1291301" y="1242961"/>
+            <a:ext cx="9144000" cy="338554"/>
           </a:xfrm>
           <a:prstGeom prst="rect">
             <a:avLst/>
@@ -7537,19 +7618,12 @@
               </a:rPr>
               <a:t>2.1.6 DEFINICIÓN DE ESTRATEGÍAS:</a:t>
             </a:r>
-          </a:p>
-          <a:p>
-            <a:pPr algn="just" defTabSz="2200275"/>
             <a:endParaRPr lang="es-CO" sz="1600" b="1" dirty="0">
               <a:solidFill>
                 <a:srgbClr val="333300"/>
               </a:solidFill>
             </a:endParaRPr>
           </a:p>
-          <a:p>
-            <a:pPr algn="just"/>
-            <a:endParaRPr lang="es-CO" sz="1400" b="1" dirty="0"/>
-          </a:p>
         </p:txBody>
       </p:sp>
       <p:sp>
@@ -7562,8 +7636,8 @@
         </p:nvSpPr>
         <p:spPr bwMode="auto">
           <a:xfrm>
-            <a:off x="1388637" y="1902472"/>
-            <a:ext cx="7974434" cy="3493264"/>
+            <a:off x="1388636" y="1540953"/>
+            <a:ext cx="9392777" cy="4470134"/>
           </a:xfrm>
           <a:prstGeom prst="rect">
             <a:avLst/>
@@ -7589,7 +7663,7 @@
               </a:spcBef>
             </a:pPr>
             <a:r>
-              <a:rPr lang="es-CO" sz="1000" dirty="0"/>
+              <a:rPr lang="es-CO" sz="1400" dirty="0"/>
               <a:t>El análisis DOFA está diseñado para ayudar a las organizaciones a encontrar el mejor acoplamiento entre las tendencias del medio, las oportunidades y amenazas y las capacidades internas, fortalezas y debilidades de la empresa.</a:t>
             </a:r>
           </a:p>
@@ -7600,7 +7674,7 @@
               </a:spcBef>
             </a:pPr>
             <a:r>
-              <a:rPr lang="es-CO" sz="1000" dirty="0"/>
+              <a:rPr lang="es-CO" sz="1400" dirty="0"/>
               <a:t>Dicho análisis permitirá a la organización formular estrategias para aprovechar sus fortalezas, prevenir el efecto de sus debilidades, utilizar a tiempo sus oportunidades y anticiparse al efecto de las amenazas.</a:t>
             </a:r>
           </a:p>
@@ -7611,7 +7685,7 @@
               </a:spcBef>
             </a:pPr>
             <a:r>
-              <a:rPr lang="es-CO" sz="1000" dirty="0"/>
+              <a:rPr lang="es-CO" sz="1400" dirty="0"/>
               <a:t>Para la determinación de las estrategias se debe realizar un trabajo con el grupo directivo de CASA GRES,   a partir del análisis DOFA en la siguiente forma:</a:t>
             </a:r>
           </a:p>
@@ -7622,15 +7696,15 @@
               </a:spcBef>
             </a:pPr>
             <a:r>
-              <a:rPr lang="es-CO" sz="1000" dirty="0"/>
+              <a:rPr lang="es-CO" sz="1400" dirty="0"/>
               <a:t>Análisis FO – analizar estrategias posibles teniendo en cuenta las fortalezas actuales de la organización que permitan </a:t>
             </a:r>
             <a:r>
-              <a:rPr lang="es-CO" sz="1000" u="sng" dirty="0"/>
+              <a:rPr lang="es-CO" sz="1400" u="sng" dirty="0"/>
               <a:t>aprovechar</a:t>
             </a:r>
             <a:r>
-              <a:rPr lang="es-CO" sz="1000" dirty="0"/>
+              <a:rPr lang="es-CO" sz="1400" dirty="0"/>
               <a:t> las oportunidades visibles.</a:t>
             </a:r>
           </a:p>
@@ -7641,15 +7715,15 @@
               </a:spcBef>
             </a:pPr>
             <a:r>
-              <a:rPr lang="es-CO" sz="1000" dirty="0"/>
+              <a:rPr lang="es-CO" sz="1400" dirty="0"/>
               <a:t>Análisis FA – analizar estrategias posibles teniendo en cuenta las fortalezas actuales de la organización que permitan </a:t>
             </a:r>
             <a:r>
-              <a:rPr lang="es-CO" sz="1000" u="sng" dirty="0"/>
+              <a:rPr lang="es-CO" sz="1400" u="sng" dirty="0"/>
               <a:t>contrarrestar</a:t>
             </a:r>
             <a:r>
-              <a:rPr lang="es-CO" sz="1000" dirty="0"/>
+              <a:rPr lang="es-CO" sz="1400" dirty="0"/>
               <a:t> las amenazas visibles.</a:t>
             </a:r>
           </a:p>
@@ -7660,15 +7734,15 @@
               </a:spcBef>
             </a:pPr>
             <a:r>
-              <a:rPr lang="es-CO" sz="1000" dirty="0"/>
+              <a:rPr lang="es-CO" sz="1400" dirty="0"/>
               <a:t>Análisis DO – analizar estrategias posibles para eliminar las debilidades actuales de la organización y que permitan </a:t>
             </a:r>
             <a:r>
-              <a:rPr lang="es-CO" sz="1000" u="sng" dirty="0"/>
+              <a:rPr lang="es-CO" sz="1400" u="sng" dirty="0"/>
               <a:t>aprovechar</a:t>
             </a:r>
             <a:r>
-              <a:rPr lang="es-CO" sz="1000" dirty="0"/>
+              <a:rPr lang="es-CO" sz="1400" dirty="0"/>
               <a:t> las oportunidades visibles. </a:t>
             </a:r>
           </a:p>
@@ -7679,15 +7753,15 @@
               </a:spcBef>
             </a:pPr>
             <a:r>
-              <a:rPr lang="es-CO" sz="1000" dirty="0"/>
+              <a:rPr lang="es-CO" sz="1400" dirty="0"/>
               <a:t>Análisis DA – analizar estrategias posibles para eliminar las debilidades actuales de la organización y que permitan </a:t>
             </a:r>
             <a:r>
-              <a:rPr lang="es-CO" sz="1000" u="sng" dirty="0"/>
+              <a:rPr lang="es-CO" sz="1400" u="sng" dirty="0"/>
               <a:t>contrarrestar</a:t>
             </a:r>
             <a:r>
-              <a:rPr lang="es-CO" sz="1000" dirty="0"/>
+              <a:rPr lang="es-CO" sz="1400" dirty="0"/>
               <a:t> las amenazas visibles. </a:t>
             </a:r>
           </a:p>
@@ -7700,19 +7774,8 @@
                 <a:spcPct val="100000"/>
               </a:spcBef>
             </a:pPr>
-            <a:endParaRPr lang="es-CO" sz="1000" dirty="0"/>
-          </a:p>
-          <a:p>
-            <a:pPr>
-              <a:lnSpc>
-                <a:spcPct val="80000"/>
-              </a:lnSpc>
-              <a:spcBef>
-                <a:spcPct val="100000"/>
-              </a:spcBef>
-            </a:pPr>
-            <a:r>
-              <a:rPr lang="es-CO" sz="1000" dirty="0"/>
+            <a:r>
+              <a:rPr lang="es-CO" sz="1400" dirty="0"/>
               <a:t>Las estrategias definidas, pero sin el análisis DOFA, pero si con la perspectiva de los objetivos estratégicos establecidos, fueron:</a:t>
             </a:r>
           </a:p>
@@ -7929,8 +7992,8 @@
         </p:nvSpPr>
         <p:spPr bwMode="auto">
           <a:xfrm>
-            <a:off x="1375575" y="1876346"/>
-            <a:ext cx="7974434" cy="3016210"/>
+            <a:off x="1375574" y="1876346"/>
+            <a:ext cx="9143999" cy="4216539"/>
           </a:xfrm>
           <a:prstGeom prst="rect">
             <a:avLst/>
@@ -7954,88 +8017,88 @@
           </a:p>
           <a:p>
             <a:r>
-              <a:rPr lang="es-CO" sz="1000" dirty="0"/>
+              <a:rPr lang="es-CO" sz="1400" dirty="0"/>
               <a:t>Es importante recordar primero una herramienta de </a:t>
             </a:r>
             <a:r>
-              <a:rPr lang="es-CO" sz="1000" dirty="0">
+              <a:rPr lang="es-CO" sz="1400" dirty="0">
                 <a:hlinkClick r:id="rId3"/>
               </a:rPr>
               <a:t>gerencia</a:t>
             </a:r>
             <a:r>
-              <a:rPr lang="es-CO" sz="1000" dirty="0"/>
+              <a:rPr lang="es-CO" sz="1400" dirty="0"/>
               <a:t> de largo plazo, denominada </a:t>
             </a:r>
             <a:r>
-              <a:rPr lang="es-CO" sz="1000" dirty="0">
+              <a:rPr lang="es-CO" sz="1400" dirty="0">
                 <a:hlinkClick r:id="rId4"/>
               </a:rPr>
               <a:t>Planificación</a:t>
             </a:r>
             <a:r>
-              <a:rPr lang="es-CO" sz="1000" dirty="0"/>
+              <a:rPr lang="es-CO" sz="1400" dirty="0"/>
               <a:t> Estratégica, que es el escenario principal donde se elaboran </a:t>
             </a:r>
             <a:r>
-              <a:rPr lang="es-CO" sz="1000" dirty="0">
+              <a:rPr lang="es-CO" sz="1400" dirty="0">
                 <a:hlinkClick r:id="rId5"/>
               </a:rPr>
               <a:t>Objetivos</a:t>
             </a:r>
             <a:r>
-              <a:rPr lang="es-CO" sz="1000" dirty="0"/>
+              <a:rPr lang="es-CO" sz="1400" dirty="0"/>
               <a:t> de largo plazo y la respectiva </a:t>
             </a:r>
             <a:r>
-              <a:rPr lang="es-CO" sz="1000" dirty="0">
+              <a:rPr lang="es-CO" sz="1400" dirty="0">
                 <a:hlinkClick r:id="rId6"/>
               </a:rPr>
               <a:t>Estrategia</a:t>
             </a:r>
             <a:r>
-              <a:rPr lang="es-CO" sz="1000" dirty="0"/>
+              <a:rPr lang="es-CO" sz="1400" dirty="0"/>
               <a:t> para alcanzar dichos objetivos, para lo cual existen una serie de metodologías, la más frecuente en nuestro medio es el </a:t>
             </a:r>
             <a:r>
-              <a:rPr lang="es-CO" sz="1000" dirty="0">
+              <a:rPr lang="es-CO" sz="1400" dirty="0">
                 <a:hlinkClick r:id="rId7"/>
               </a:rPr>
               <a:t>análisis</a:t>
             </a:r>
             <a:r>
-              <a:rPr lang="es-CO" sz="1000" dirty="0"/>
+              <a:rPr lang="es-CO" sz="1400" dirty="0"/>
               <a:t> DOFA. Pero el problema que todas las </a:t>
             </a:r>
             <a:r>
-              <a:rPr lang="es-CO" sz="1000" dirty="0">
+              <a:rPr lang="es-CO" sz="1400" dirty="0">
                 <a:hlinkClick r:id="rId8"/>
               </a:rPr>
               <a:t>empresas</a:t>
             </a:r>
             <a:r>
-              <a:rPr lang="es-CO" sz="1000" dirty="0"/>
+              <a:rPr lang="es-CO" sz="1400" dirty="0"/>
               <a:t> enfrentan no es que no cuente con un </a:t>
             </a:r>
             <a:r>
-              <a:rPr lang="es-CO" sz="1000" dirty="0">
+              <a:rPr lang="es-CO" sz="1400" dirty="0">
                 <a:hlinkClick r:id="rId9"/>
               </a:rPr>
               <a:t>plan</a:t>
             </a:r>
             <a:r>
-              <a:rPr lang="es-CO" sz="1000" dirty="0"/>
+              <a:rPr lang="es-CO" sz="1400" dirty="0"/>
               <a:t> estratégico, sino que no llegan a ejecutarlo por completo, es decir, muchas veces solo sirve como un documento de gerencia que </a:t>
             </a:r>
             <a:r>
-              <a:rPr lang="es-CO" sz="1000" dirty="0">
+              <a:rPr lang="es-CO" sz="1400" dirty="0">
                 <a:hlinkClick r:id="rId8"/>
               </a:rPr>
               <a:t>la empresa</a:t>
             </a:r>
             <a:r>
-              <a:rPr lang="es-CO" sz="1000" dirty="0"/>
-              <a:t> cuenta pero no lo utiliza, como las empresas se enfocan más en corto plazo no logran cumplir adecuadamente sus objetivos de largo plazo</a:t>
+              <a:rPr lang="es-CO" sz="1400" dirty="0"/>
+              <a:t> cuenta pero no lo utiliza, como las empresas se enfocan más en corto plazo no logran cumplir adecuadamente sus objetivos de largo plazo.</a:t>
             </a:r>
           </a:p>
           <a:p>
@@ -8045,92 +8108,92 @@
               </a:spcBef>
             </a:pPr>
             <a:r>
-              <a:rPr lang="es-CO" sz="1000" dirty="0"/>
+              <a:rPr lang="es-CO" sz="1400" dirty="0"/>
               <a:t>En esta parte es donde entra el CMI, que es una herramienta que ayuda a traducir la estrategia y/o visión de largo plazo de una </a:t>
             </a:r>
             <a:r>
-              <a:rPr lang="es-CO" sz="1000" dirty="0">
+              <a:rPr lang="es-CO" sz="1400" dirty="0">
                 <a:hlinkClick r:id="rId8"/>
               </a:rPr>
               <a:t>empresa</a:t>
             </a:r>
             <a:r>
-              <a:rPr lang="es-CO" sz="1000" dirty="0"/>
+              <a:rPr lang="es-CO" sz="1400" dirty="0"/>
               <a:t> en un conjunto de objetivos operativos (entendiendo operativo como </a:t>
             </a:r>
             <a:r>
-              <a:rPr lang="es-CO" sz="1000" dirty="0">
+              <a:rPr lang="es-CO" sz="1400" dirty="0">
                 <a:hlinkClick r:id="rId10"/>
               </a:rPr>
               <a:t>acciones</a:t>
             </a:r>
             <a:r>
-              <a:rPr lang="es-CO" sz="1000" dirty="0"/>
+              <a:rPr lang="es-CO" sz="1400" dirty="0"/>
               <a:t> de corto plazo) que permitan gestionar la estrategia, desde el corto hasta el largo plazo, a través de </a:t>
             </a:r>
             <a:r>
-              <a:rPr lang="es-CO" sz="1000" dirty="0">
+              <a:rPr lang="es-CO" sz="1400" dirty="0">
                 <a:hlinkClick r:id="rId11"/>
               </a:rPr>
               <a:t>indicadores</a:t>
             </a:r>
             <a:r>
-              <a:rPr lang="es-CO" sz="1000" dirty="0"/>
-              <a:t> de actuación</a:t>
+              <a:rPr lang="es-CO" sz="1400" dirty="0"/>
+              <a:t> de actuación.</a:t>
             </a:r>
             <a:br>
-              <a:rPr lang="es-CO" sz="1000" dirty="0"/>
+              <a:rPr lang="es-CO" sz="1400" dirty="0"/>
             </a:br>
-            <a:endParaRPr lang="es-CO" sz="1000" dirty="0"/>
-          </a:p>
-          <a:p>
-            <a:r>
-              <a:rPr lang="es-CO" sz="1000" dirty="0"/>
+            <a:endParaRPr lang="es-CO" sz="1400" dirty="0"/>
+          </a:p>
+          <a:p>
+            <a:r>
+              <a:rPr lang="es-CO" sz="1400" dirty="0"/>
               <a:t>El CMI NO es un Sistema de </a:t>
             </a:r>
             <a:r>
-              <a:rPr lang="es-CO" sz="1000" dirty="0">
+              <a:rPr lang="es-CO" sz="1400" dirty="0">
                 <a:hlinkClick r:id="rId12"/>
               </a:rPr>
               <a:t>Control</a:t>
             </a:r>
             <a:r>
-              <a:rPr lang="es-CO" sz="1000" dirty="0"/>
-              <a:t>, al utilizarla de este modo le quitamos la esencia misma de esta herramienta, en razón a que fue diseñada para administrar la estrategia de largo plazo de la empresa y no para controlar determinadas accionas administrativas, por ello el CMI debe ser utilizado como un sistema de </a:t>
-            </a:r>
-            <a:r>
-              <a:rPr lang="es-CO" sz="1000" dirty="0">
+              <a:rPr lang="es-CO" sz="1400" dirty="0"/>
+              <a:t>, al utilizarla de este modo le quitamos la esencia misma de esta herramienta, en razón a que fue diseñada para administrar la estrategia de largo plazo de la empresa y no para controlar determinadas acciones administrativas, por ello el CMI debe ser utilizado como un sistema de </a:t>
+            </a:r>
+            <a:r>
+              <a:rPr lang="es-CO" sz="1400" dirty="0">
                 <a:hlinkClick r:id="rId13"/>
               </a:rPr>
               <a:t>comunicación</a:t>
             </a:r>
             <a:r>
-              <a:rPr lang="es-CO" sz="1000" dirty="0"/>
+              <a:rPr lang="es-CO" sz="1400" dirty="0"/>
               <a:t>, de </a:t>
             </a:r>
             <a:r>
-              <a:rPr lang="es-CO" sz="1000" dirty="0">
+              <a:rPr lang="es-CO" sz="1400" dirty="0">
                 <a:hlinkClick r:id="rId14"/>
               </a:rPr>
               <a:t>información</a:t>
             </a:r>
             <a:r>
-              <a:rPr lang="es-CO" sz="1000" dirty="0"/>
+              <a:rPr lang="es-CO" sz="1400" dirty="0"/>
               <a:t> y de formación (evidentemente de la estrategia) y NO como un sistema de control, y transforma la </a:t>
             </a:r>
             <a:r>
-              <a:rPr lang="es-CO" sz="1000" dirty="0">
+              <a:rPr lang="es-CO" sz="1400" dirty="0">
                 <a:hlinkClick r:id="rId15"/>
               </a:rPr>
               <a:t>Visión</a:t>
             </a:r>
             <a:r>
-              <a:rPr lang="es-CO" sz="1000" dirty="0"/>
+              <a:rPr lang="es-CO" sz="1400" dirty="0"/>
               <a:t>  y la estrategia en objetivos e indicadores organizados en cuatro perspectivas, de Aprendizaje Organizacional, de Procesos, Comercial y Financiera.</a:t>
             </a:r>
           </a:p>
           <a:p>
-            <a:endParaRPr lang="es-CO" sz="1000" dirty="0"/>
+            <a:endParaRPr lang="es-CO" sz="1400" dirty="0"/>
           </a:p>
           <a:p>
             <a:br>
@@ -9562,7 +9625,7 @@
             </a:r>
             <a:r>
               <a:rPr lang="es-ES" sz="1600" dirty="0" err="1"/>
-              <a:t>corporation</a:t>
+              <a:t>Corporation</a:t>
             </a:r>
             <a:r>
               <a:rPr lang="es-ES" sz="1600" dirty="0"/>

</xml_diff>